<commit_message>
moved notes to power point presentation
</commit_message>
<xml_diff>
--- a/WebSocketsPresentation.pptx
+++ b/WebSocketsPresentation.pptx
@@ -9,8 +9,10 @@
     <p:sldId id="257" r:id="rId3"/>
     <p:sldId id="261" r:id="rId4"/>
     <p:sldId id="260" r:id="rId5"/>
-    <p:sldId id="259" r:id="rId6"/>
-    <p:sldId id="258" r:id="rId7"/>
+    <p:sldId id="262" r:id="rId6"/>
+    <p:sldId id="259" r:id="rId7"/>
+    <p:sldId id="263" r:id="rId8"/>
+    <p:sldId id="258" r:id="rId9"/>
   </p:sldIdLst>
   <p:sldSz cx="12192000" cy="6858000"/>
   <p:notesSz cx="6858000" cy="9144000"/>
@@ -109,6 +111,11 @@
       </a:defRPr>
     </a:lvl9pPr>
   </p:defaultTextStyle>
+  <p:extLst>
+    <p:ext uri="{EFAFB233-063F-42B5-8137-9DF3F51BA10A}">
+      <p15:sldGuideLst xmlns:p15="http://schemas.microsoft.com/office/powerpoint/2012/main"/>
+    </p:ext>
+  </p:extLst>
 </p:presentation>
 </file>
 
@@ -162,7 +169,7 @@
           <a:noFill/>
           <a:extLst>
             <a:ext uri="{909E8E84-426E-40dd-AFC4-6F175D3DCCD1}">
-              <a14:hiddenFill xmlns:a14="http://schemas.microsoft.com/office/drawing/2010/main" xmlns="">
+              <a14:hiddenFill xmlns="" xmlns:a14="http://schemas.microsoft.com/office/drawing/2010/main">
                 <a:solidFill>
                   <a:srgbClr val="FFFFFF"/>
                 </a:solidFill>
@@ -222,7 +229,7 @@
             </a:ln>
             <a:extLst>
               <a:ext uri="{91240B29-F687-4f45-9708-019B960494DF}">
-                <a14:hiddenLine xmlns:a14="http://schemas.microsoft.com/office/drawing/2010/main" xmlns="" w="9525">
+                <a14:hiddenLine xmlns="" xmlns:a14="http://schemas.microsoft.com/office/drawing/2010/main" w="9525">
                   <a:solidFill>
                     <a:srgbClr val="000000"/>
                   </a:solidFill>
@@ -312,7 +319,7 @@
             </a:ln>
             <a:extLst>
               <a:ext uri="{91240B29-F687-4f45-9708-019B960494DF}">
-                <a14:hiddenLine xmlns:a14="http://schemas.microsoft.com/office/drawing/2010/main" xmlns="" w="9525">
+                <a14:hiddenLine xmlns="" xmlns:a14="http://schemas.microsoft.com/office/drawing/2010/main" w="9525">
                   <a:solidFill>
                     <a:srgbClr val="000000"/>
                   </a:solidFill>
@@ -402,7 +409,7 @@
             </a:ln>
             <a:extLst>
               <a:ext uri="{91240B29-F687-4f45-9708-019B960494DF}">
-                <a14:hiddenLine xmlns:a14="http://schemas.microsoft.com/office/drawing/2010/main" xmlns="" w="9525">
+                <a14:hiddenLine xmlns="" xmlns:a14="http://schemas.microsoft.com/office/drawing/2010/main" w="9525">
                   <a:solidFill>
                     <a:srgbClr val="000000"/>
                   </a:solidFill>
@@ -436,7 +443,7 @@
             </a:ln>
             <a:extLst>
               <a:ext uri="{91240B29-F687-4f45-9708-019B960494DF}">
-                <a14:hiddenLine xmlns:a14="http://schemas.microsoft.com/office/drawing/2010/main" xmlns="" w="9525">
+                <a14:hiddenLine xmlns="" xmlns:a14="http://schemas.microsoft.com/office/drawing/2010/main" w="9525">
                   <a:solidFill>
                     <a:srgbClr val="000000"/>
                   </a:solidFill>
@@ -526,7 +533,7 @@
             </a:ln>
             <a:extLst>
               <a:ext uri="{91240B29-F687-4f45-9708-019B960494DF}">
-                <a14:hiddenLine xmlns:a14="http://schemas.microsoft.com/office/drawing/2010/main" xmlns="" w="9525">
+                <a14:hiddenLine xmlns="" xmlns:a14="http://schemas.microsoft.com/office/drawing/2010/main" w="9525">
                   <a:solidFill>
                     <a:srgbClr val="000000"/>
                   </a:solidFill>
@@ -588,7 +595,7 @@
             </a:ln>
             <a:extLst>
               <a:ext uri="{91240B29-F687-4f45-9708-019B960494DF}">
-                <a14:hiddenLine xmlns:a14="http://schemas.microsoft.com/office/drawing/2010/main" xmlns="" w="9525">
+                <a14:hiddenLine xmlns="" xmlns:a14="http://schemas.microsoft.com/office/drawing/2010/main" w="9525">
                   <a:solidFill>
                     <a:srgbClr val="000000"/>
                   </a:solidFill>
@@ -650,7 +657,7 @@
             </a:ln>
             <a:extLst>
               <a:ext uri="{91240B29-F687-4f45-9708-019B960494DF}">
-                <a14:hiddenLine xmlns:a14="http://schemas.microsoft.com/office/drawing/2010/main" xmlns="" w="9525">
+                <a14:hiddenLine xmlns="" xmlns:a14="http://schemas.microsoft.com/office/drawing/2010/main" w="9525">
                   <a:solidFill>
                     <a:srgbClr val="000000"/>
                   </a:solidFill>
@@ -740,7 +747,7 @@
             </a:ln>
             <a:extLst>
               <a:ext uri="{91240B29-F687-4f45-9708-019B960494DF}">
-                <a14:hiddenLine xmlns:a14="http://schemas.microsoft.com/office/drawing/2010/main" xmlns="" w="9525">
+                <a14:hiddenLine xmlns="" xmlns:a14="http://schemas.microsoft.com/office/drawing/2010/main" w="9525">
                   <a:solidFill>
                     <a:srgbClr val="000000"/>
                   </a:solidFill>
@@ -802,7 +809,7 @@
             </a:ln>
             <a:extLst>
               <a:ext uri="{91240B29-F687-4f45-9708-019B960494DF}">
-                <a14:hiddenLine xmlns:a14="http://schemas.microsoft.com/office/drawing/2010/main" xmlns="" w="9525">
+                <a14:hiddenLine xmlns="" xmlns:a14="http://schemas.microsoft.com/office/drawing/2010/main" w="9525">
                   <a:solidFill>
                     <a:srgbClr val="000000"/>
                   </a:solidFill>
@@ -864,7 +871,7 @@
             </a:ln>
             <a:extLst>
               <a:ext uri="{91240B29-F687-4f45-9708-019B960494DF}">
-                <a14:hiddenLine xmlns:a14="http://schemas.microsoft.com/office/drawing/2010/main" xmlns="" w="9525">
+                <a14:hiddenLine xmlns="" xmlns:a14="http://schemas.microsoft.com/office/drawing/2010/main" w="9525">
                   <a:solidFill>
                     <a:srgbClr val="000000"/>
                   </a:solidFill>
@@ -954,7 +961,7 @@
             </a:ln>
             <a:extLst>
               <a:ext uri="{91240B29-F687-4f45-9708-019B960494DF}">
-                <a14:hiddenLine xmlns:a14="http://schemas.microsoft.com/office/drawing/2010/main" xmlns="" w="9525">
+                <a14:hiddenLine xmlns="" xmlns:a14="http://schemas.microsoft.com/office/drawing/2010/main" w="9525">
                   <a:solidFill>
                     <a:srgbClr val="000000"/>
                   </a:solidFill>
@@ -1044,7 +1051,7 @@
             </a:ln>
             <a:extLst>
               <a:ext uri="{91240B29-F687-4f45-9708-019B960494DF}">
-                <a14:hiddenLine xmlns:a14="http://schemas.microsoft.com/office/drawing/2010/main" xmlns="" w="9525">
+                <a14:hiddenLine xmlns="" xmlns:a14="http://schemas.microsoft.com/office/drawing/2010/main" w="9525">
                   <a:solidFill>
                     <a:srgbClr val="000000"/>
                   </a:solidFill>
@@ -1106,7 +1113,7 @@
             </a:ln>
             <a:extLst>
               <a:ext uri="{91240B29-F687-4f45-9708-019B960494DF}">
-                <a14:hiddenLine xmlns:a14="http://schemas.microsoft.com/office/drawing/2010/main" xmlns="" w="9525">
+                <a14:hiddenLine xmlns="" xmlns:a14="http://schemas.microsoft.com/office/drawing/2010/main" w="9525">
                   <a:solidFill>
                     <a:srgbClr val="000000"/>
                   </a:solidFill>
@@ -1216,7 +1223,7 @@
             </a:ln>
             <a:extLst>
               <a:ext uri="{91240B29-F687-4f45-9708-019B960494DF}">
-                <a14:hiddenLine xmlns:a14="http://schemas.microsoft.com/office/drawing/2010/main" xmlns="" w="9525">
+                <a14:hiddenLine xmlns="" xmlns:a14="http://schemas.microsoft.com/office/drawing/2010/main" w="9525">
                   <a:solidFill>
                     <a:srgbClr val="000000"/>
                   </a:solidFill>
@@ -1278,7 +1285,7 @@
             </a:ln>
             <a:extLst>
               <a:ext uri="{91240B29-F687-4f45-9708-019B960494DF}">
-                <a14:hiddenLine xmlns:a14="http://schemas.microsoft.com/office/drawing/2010/main" xmlns="" w="9525">
+                <a14:hiddenLine xmlns="" xmlns:a14="http://schemas.microsoft.com/office/drawing/2010/main" w="9525">
                   <a:solidFill>
                     <a:srgbClr val="000000"/>
                   </a:solidFill>
@@ -1368,7 +1375,7 @@
             </a:ln>
             <a:extLst>
               <a:ext uri="{91240B29-F687-4f45-9708-019B960494DF}">
-                <a14:hiddenLine xmlns:a14="http://schemas.microsoft.com/office/drawing/2010/main" xmlns="" w="9525">
+                <a14:hiddenLine xmlns="" xmlns:a14="http://schemas.microsoft.com/office/drawing/2010/main" w="9525">
                   <a:solidFill>
                     <a:srgbClr val="000000"/>
                   </a:solidFill>
@@ -1458,7 +1465,7 @@
             </a:ln>
             <a:extLst>
               <a:ext uri="{91240B29-F687-4f45-9708-019B960494DF}">
-                <a14:hiddenLine xmlns:a14="http://schemas.microsoft.com/office/drawing/2010/main" xmlns="" w="9525">
+                <a14:hiddenLine xmlns="" xmlns:a14="http://schemas.microsoft.com/office/drawing/2010/main" w="9525">
                   <a:solidFill>
                     <a:srgbClr val="000000"/>
                   </a:solidFill>
@@ -1520,7 +1527,7 @@
             </a:ln>
             <a:extLst>
               <a:ext uri="{91240B29-F687-4f45-9708-019B960494DF}">
-                <a14:hiddenLine xmlns:a14="http://schemas.microsoft.com/office/drawing/2010/main" xmlns="" w="9525">
+                <a14:hiddenLine xmlns="" xmlns:a14="http://schemas.microsoft.com/office/drawing/2010/main" w="9525">
                   <a:solidFill>
                     <a:srgbClr val="000000"/>
                   </a:solidFill>
@@ -1610,7 +1617,7 @@
             </a:ln>
             <a:extLst>
               <a:ext uri="{91240B29-F687-4f45-9708-019B960494DF}">
-                <a14:hiddenLine xmlns:a14="http://schemas.microsoft.com/office/drawing/2010/main" xmlns="" w="9525">
+                <a14:hiddenLine xmlns="" xmlns:a14="http://schemas.microsoft.com/office/drawing/2010/main" w="9525">
                   <a:solidFill>
                     <a:srgbClr val="000000"/>
                   </a:solidFill>
@@ -1700,7 +1707,7 @@
             </a:ln>
             <a:extLst>
               <a:ext uri="{91240B29-F687-4f45-9708-019B960494DF}">
-                <a14:hiddenLine xmlns:a14="http://schemas.microsoft.com/office/drawing/2010/main" xmlns="" w="9525">
+                <a14:hiddenLine xmlns="" xmlns:a14="http://schemas.microsoft.com/office/drawing/2010/main" w="9525">
                   <a:solidFill>
                     <a:srgbClr val="000000"/>
                   </a:solidFill>
@@ -1756,7 +1763,7 @@
             </a:ln>
             <a:extLst>
               <a:ext uri="{91240B29-F687-4f45-9708-019B960494DF}">
-                <a14:hiddenLine xmlns:a14="http://schemas.microsoft.com/office/drawing/2010/main" xmlns="" w="9525">
+                <a14:hiddenLine xmlns="" xmlns:a14="http://schemas.microsoft.com/office/drawing/2010/main" w="9525">
                   <a:solidFill>
                     <a:srgbClr val="000000"/>
                   </a:solidFill>
@@ -1846,7 +1853,7 @@
             </a:ln>
             <a:extLst>
               <a:ext uri="{91240B29-F687-4f45-9708-019B960494DF}">
-                <a14:hiddenLine xmlns:a14="http://schemas.microsoft.com/office/drawing/2010/main" xmlns="" w="9525">
+                <a14:hiddenLine xmlns="" xmlns:a14="http://schemas.microsoft.com/office/drawing/2010/main" w="9525">
                   <a:solidFill>
                     <a:srgbClr val="000000"/>
                   </a:solidFill>
@@ -1902,7 +1909,7 @@
             </a:ln>
             <a:extLst>
               <a:ext uri="{91240B29-F687-4f45-9708-019B960494DF}">
-                <a14:hiddenLine xmlns:a14="http://schemas.microsoft.com/office/drawing/2010/main" xmlns="" w="9525">
+                <a14:hiddenLine xmlns="" xmlns:a14="http://schemas.microsoft.com/office/drawing/2010/main" w="9525">
                   <a:solidFill>
                     <a:srgbClr val="000000"/>
                   </a:solidFill>
@@ -1992,7 +1999,7 @@
             </a:ln>
             <a:extLst>
               <a:ext uri="{91240B29-F687-4f45-9708-019B960494DF}">
-                <a14:hiddenLine xmlns:a14="http://schemas.microsoft.com/office/drawing/2010/main" xmlns="" w="9525">
+                <a14:hiddenLine xmlns="" xmlns:a14="http://schemas.microsoft.com/office/drawing/2010/main" w="9525">
                   <a:solidFill>
                     <a:srgbClr val="000000"/>
                   </a:solidFill>
@@ -2060,7 +2067,7 @@
             </a:ln>
             <a:extLst>
               <a:ext uri="{91240B29-F687-4f45-9708-019B960494DF}">
-                <a14:hiddenLine xmlns:a14="http://schemas.microsoft.com/office/drawing/2010/main" xmlns="" w="9525">
+                <a14:hiddenLine xmlns="" xmlns:a14="http://schemas.microsoft.com/office/drawing/2010/main" w="9525">
                   <a:solidFill>
                     <a:srgbClr val="000000"/>
                   </a:solidFill>
@@ -2150,7 +2157,7 @@
             </a:ln>
             <a:extLst>
               <a:ext uri="{91240B29-F687-4f45-9708-019B960494DF}">
-                <a14:hiddenLine xmlns:a14="http://schemas.microsoft.com/office/drawing/2010/main" xmlns="" w="9525">
+                <a14:hiddenLine xmlns="" xmlns:a14="http://schemas.microsoft.com/office/drawing/2010/main" w="9525">
                   <a:solidFill>
                     <a:srgbClr val="000000"/>
                   </a:solidFill>
@@ -2218,7 +2225,7 @@
             </a:ln>
             <a:extLst>
               <a:ext uri="{91240B29-F687-4f45-9708-019B960494DF}">
-                <a14:hiddenLine xmlns:a14="http://schemas.microsoft.com/office/drawing/2010/main" xmlns="" w="9525">
+                <a14:hiddenLine xmlns="" xmlns:a14="http://schemas.microsoft.com/office/drawing/2010/main" w="9525">
                   <a:solidFill>
                     <a:srgbClr val="000000"/>
                   </a:solidFill>
@@ -2308,7 +2315,7 @@
             </a:ln>
             <a:extLst>
               <a:ext uri="{91240B29-F687-4f45-9708-019B960494DF}">
-                <a14:hiddenLine xmlns:a14="http://schemas.microsoft.com/office/drawing/2010/main" xmlns="" w="9525">
+                <a14:hiddenLine xmlns="" xmlns:a14="http://schemas.microsoft.com/office/drawing/2010/main" w="9525">
                   <a:solidFill>
                     <a:srgbClr val="000000"/>
                   </a:solidFill>
@@ -2342,7 +2349,7 @@
             </a:ln>
             <a:extLst>
               <a:ext uri="{91240B29-F687-4f45-9708-019B960494DF}">
-                <a14:hiddenLine xmlns:a14="http://schemas.microsoft.com/office/drawing/2010/main" xmlns="" w="9525">
+                <a14:hiddenLine xmlns="" xmlns:a14="http://schemas.microsoft.com/office/drawing/2010/main" w="9525">
                   <a:solidFill>
                     <a:srgbClr val="000000"/>
                   </a:solidFill>
@@ -2432,7 +2439,7 @@
             </a:ln>
             <a:extLst>
               <a:ext uri="{91240B29-F687-4f45-9708-019B960494DF}">
-                <a14:hiddenLine xmlns:a14="http://schemas.microsoft.com/office/drawing/2010/main" xmlns="" w="9525">
+                <a14:hiddenLine xmlns="" xmlns:a14="http://schemas.microsoft.com/office/drawing/2010/main" w="9525">
                   <a:solidFill>
                     <a:srgbClr val="000000"/>
                   </a:solidFill>
@@ -2494,7 +2501,7 @@
             </a:ln>
             <a:extLst>
               <a:ext uri="{91240B29-F687-4f45-9708-019B960494DF}">
-                <a14:hiddenLine xmlns:a14="http://schemas.microsoft.com/office/drawing/2010/main" xmlns="" w="9525">
+                <a14:hiddenLine xmlns="" xmlns:a14="http://schemas.microsoft.com/office/drawing/2010/main" w="9525">
                   <a:solidFill>
                     <a:srgbClr val="000000"/>
                   </a:solidFill>
@@ -2556,7 +2563,7 @@
             </a:ln>
             <a:extLst>
               <a:ext uri="{91240B29-F687-4f45-9708-019B960494DF}">
-                <a14:hiddenLine xmlns:a14="http://schemas.microsoft.com/office/drawing/2010/main" xmlns="" w="9525">
+                <a14:hiddenLine xmlns="" xmlns:a14="http://schemas.microsoft.com/office/drawing/2010/main" w="9525">
                   <a:solidFill>
                     <a:srgbClr val="000000"/>
                   </a:solidFill>
@@ -2646,7 +2653,7 @@
             </a:ln>
             <a:extLst>
               <a:ext uri="{91240B29-F687-4f45-9708-019B960494DF}">
-                <a14:hiddenLine xmlns:a14="http://schemas.microsoft.com/office/drawing/2010/main" xmlns="" w="9525">
+                <a14:hiddenLine xmlns="" xmlns:a14="http://schemas.microsoft.com/office/drawing/2010/main" w="9525">
                   <a:solidFill>
                     <a:srgbClr val="000000"/>
                   </a:solidFill>
@@ -2714,7 +2721,7 @@
             </a:ln>
             <a:extLst>
               <a:ext uri="{91240B29-F687-4f45-9708-019B960494DF}">
-                <a14:hiddenLine xmlns:a14="http://schemas.microsoft.com/office/drawing/2010/main" xmlns="" w="9525">
+                <a14:hiddenLine xmlns="" xmlns:a14="http://schemas.microsoft.com/office/drawing/2010/main" w="9525">
                   <a:solidFill>
                     <a:srgbClr val="000000"/>
                   </a:solidFill>
@@ -2776,7 +2783,7 @@
             </a:ln>
             <a:extLst>
               <a:ext uri="{91240B29-F687-4f45-9708-019B960494DF}">
-                <a14:hiddenLine xmlns:a14="http://schemas.microsoft.com/office/drawing/2010/main" xmlns="" w="9525">
+                <a14:hiddenLine xmlns="" xmlns:a14="http://schemas.microsoft.com/office/drawing/2010/main" w="9525">
                   <a:solidFill>
                     <a:srgbClr val="000000"/>
                   </a:solidFill>
@@ -2866,7 +2873,7 @@
             </a:ln>
             <a:extLst>
               <a:ext uri="{91240B29-F687-4f45-9708-019B960494DF}">
-                <a14:hiddenLine xmlns:a14="http://schemas.microsoft.com/office/drawing/2010/main" xmlns="" w="9525">
+                <a14:hiddenLine xmlns="" xmlns:a14="http://schemas.microsoft.com/office/drawing/2010/main" w="9525">
                   <a:solidFill>
                     <a:srgbClr val="000000"/>
                   </a:solidFill>
@@ -2928,7 +2935,7 @@
             </a:ln>
             <a:extLst>
               <a:ext uri="{91240B29-F687-4f45-9708-019B960494DF}">
-                <a14:hiddenLine xmlns:a14="http://schemas.microsoft.com/office/drawing/2010/main" xmlns="" w="9525">
+                <a14:hiddenLine xmlns="" xmlns:a14="http://schemas.microsoft.com/office/drawing/2010/main" w="9525">
                   <a:solidFill>
                     <a:srgbClr val="000000"/>
                   </a:solidFill>
@@ -3018,7 +3025,7 @@
             </a:ln>
             <a:extLst>
               <a:ext uri="{91240B29-F687-4f45-9708-019B960494DF}">
-                <a14:hiddenLine xmlns:a14="http://schemas.microsoft.com/office/drawing/2010/main" xmlns="" w="9525">
+                <a14:hiddenLine xmlns="" xmlns:a14="http://schemas.microsoft.com/office/drawing/2010/main" w="9525">
                   <a:solidFill>
                     <a:srgbClr val="000000"/>
                   </a:solidFill>
@@ -3080,7 +3087,7 @@
             </a:ln>
             <a:extLst>
               <a:ext uri="{91240B29-F687-4f45-9708-019B960494DF}">
-                <a14:hiddenLine xmlns:a14="http://schemas.microsoft.com/office/drawing/2010/main" xmlns="" w="9525">
+                <a14:hiddenLine xmlns="" xmlns:a14="http://schemas.microsoft.com/office/drawing/2010/main" w="9525">
                   <a:solidFill>
                     <a:srgbClr val="000000"/>
                   </a:solidFill>
@@ -3170,7 +3177,7 @@
             </a:ln>
             <a:extLst>
               <a:ext uri="{91240B29-F687-4f45-9708-019B960494DF}">
-                <a14:hiddenLine xmlns:a14="http://schemas.microsoft.com/office/drawing/2010/main" xmlns="" w="9525">
+                <a14:hiddenLine xmlns="" xmlns:a14="http://schemas.microsoft.com/office/drawing/2010/main" w="9525">
                   <a:solidFill>
                     <a:srgbClr val="000000"/>
                   </a:solidFill>
@@ -3204,7 +3211,7 @@
             </a:ln>
             <a:extLst>
               <a:ext uri="{91240B29-F687-4f45-9708-019B960494DF}">
-                <a14:hiddenLine xmlns:a14="http://schemas.microsoft.com/office/drawing/2010/main" xmlns="" w="9525">
+                <a14:hiddenLine xmlns="" xmlns:a14="http://schemas.microsoft.com/office/drawing/2010/main" w="9525">
                   <a:solidFill>
                     <a:srgbClr val="000000"/>
                   </a:solidFill>
@@ -3269,7 +3276,7 @@
             </a:ln>
             <a:extLst>
               <a:ext uri="{91240B29-F687-4f45-9708-019B960494DF}">
-                <a14:hiddenLine xmlns:a14="http://schemas.microsoft.com/office/drawing/2010/main" xmlns="" w="9525">
+                <a14:hiddenLine xmlns="" xmlns:a14="http://schemas.microsoft.com/office/drawing/2010/main" w="9525">
                   <a:solidFill>
                     <a:srgbClr val="000000"/>
                   </a:solidFill>
@@ -3359,7 +3366,7 @@
             </a:ln>
             <a:extLst>
               <a:ext uri="{91240B29-F687-4f45-9708-019B960494DF}">
-                <a14:hiddenLine xmlns:a14="http://schemas.microsoft.com/office/drawing/2010/main" xmlns="" w="9525">
+                <a14:hiddenLine xmlns="" xmlns:a14="http://schemas.microsoft.com/office/drawing/2010/main" w="9525">
                   <a:solidFill>
                     <a:srgbClr val="000000"/>
                   </a:solidFill>
@@ -3421,7 +3428,7 @@
             </a:ln>
             <a:extLst>
               <a:ext uri="{91240B29-F687-4f45-9708-019B960494DF}">
-                <a14:hiddenLine xmlns:a14="http://schemas.microsoft.com/office/drawing/2010/main" xmlns="" w="9525">
+                <a14:hiddenLine xmlns="" xmlns:a14="http://schemas.microsoft.com/office/drawing/2010/main" w="9525">
                   <a:solidFill>
                     <a:srgbClr val="000000"/>
                   </a:solidFill>
@@ -3511,7 +3518,7 @@
             </a:ln>
             <a:extLst>
               <a:ext uri="{91240B29-F687-4f45-9708-019B960494DF}">
-                <a14:hiddenLine xmlns:a14="http://schemas.microsoft.com/office/drawing/2010/main" xmlns="" w="9525">
+                <a14:hiddenLine xmlns="" xmlns:a14="http://schemas.microsoft.com/office/drawing/2010/main" w="9525">
                   <a:solidFill>
                     <a:srgbClr val="000000"/>
                   </a:solidFill>
@@ -3601,7 +3608,7 @@
             </a:ln>
             <a:extLst>
               <a:ext uri="{91240B29-F687-4f45-9708-019B960494DF}">
-                <a14:hiddenLine xmlns:a14="http://schemas.microsoft.com/office/drawing/2010/main" xmlns="" w="9525">
+                <a14:hiddenLine xmlns="" xmlns:a14="http://schemas.microsoft.com/office/drawing/2010/main" w="9525">
                   <a:solidFill>
                     <a:srgbClr val="000000"/>
                   </a:solidFill>
@@ -3666,7 +3673,7 @@
             </a:ln>
             <a:extLst>
               <a:ext uri="{91240B29-F687-4f45-9708-019B960494DF}">
-                <a14:hiddenLine xmlns:a14="http://schemas.microsoft.com/office/drawing/2010/main" xmlns="" w="9525">
+                <a14:hiddenLine xmlns="" xmlns:a14="http://schemas.microsoft.com/office/drawing/2010/main" w="9525">
                   <a:solidFill>
                     <a:srgbClr val="000000"/>
                   </a:solidFill>
@@ -3728,7 +3735,7 @@
             </a:ln>
             <a:extLst>
               <a:ext uri="{91240B29-F687-4f45-9708-019B960494DF}">
-                <a14:hiddenLine xmlns:a14="http://schemas.microsoft.com/office/drawing/2010/main" xmlns="" w="9525">
+                <a14:hiddenLine xmlns="" xmlns:a14="http://schemas.microsoft.com/office/drawing/2010/main" w="9525">
                   <a:solidFill>
                     <a:srgbClr val="000000"/>
                   </a:solidFill>
@@ -3818,7 +3825,7 @@
             </a:ln>
             <a:extLst>
               <a:ext uri="{91240B29-F687-4f45-9708-019B960494DF}">
-                <a14:hiddenLine xmlns:a14="http://schemas.microsoft.com/office/drawing/2010/main" xmlns="" w="9525">
+                <a14:hiddenLine xmlns="" xmlns:a14="http://schemas.microsoft.com/office/drawing/2010/main" w="9525">
                   <a:solidFill>
                     <a:srgbClr val="000000"/>
                   </a:solidFill>
@@ -3908,7 +3915,7 @@
             </a:ln>
             <a:extLst>
               <a:ext uri="{91240B29-F687-4f45-9708-019B960494DF}">
-                <a14:hiddenLine xmlns:a14="http://schemas.microsoft.com/office/drawing/2010/main" xmlns="" w="9525">
+                <a14:hiddenLine xmlns="" xmlns:a14="http://schemas.microsoft.com/office/drawing/2010/main" w="9525">
                   <a:solidFill>
                     <a:srgbClr val="000000"/>
                   </a:solidFill>
@@ -3970,7 +3977,7 @@
             </a:ln>
             <a:extLst>
               <a:ext uri="{91240B29-F687-4f45-9708-019B960494DF}">
-                <a14:hiddenLine xmlns:a14="http://schemas.microsoft.com/office/drawing/2010/main" xmlns="" w="9525">
+                <a14:hiddenLine xmlns="" xmlns:a14="http://schemas.microsoft.com/office/drawing/2010/main" w="9525">
                   <a:solidFill>
                     <a:srgbClr val="000000"/>
                   </a:solidFill>
@@ -4090,7 +4097,7 @@
             </a:ln>
             <a:extLst>
               <a:ext uri="{91240B29-F687-4f45-9708-019B960494DF}">
-                <a14:hiddenLine xmlns:a14="http://schemas.microsoft.com/office/drawing/2010/main" xmlns="" w="9525">
+                <a14:hiddenLine xmlns="" xmlns:a14="http://schemas.microsoft.com/office/drawing/2010/main" w="9525">
                   <a:solidFill>
                     <a:srgbClr val="000000"/>
                   </a:solidFill>
@@ -4158,7 +4165,7 @@
             </a:ln>
             <a:extLst>
               <a:ext uri="{91240B29-F687-4f45-9708-019B960494DF}">
-                <a14:hiddenLine xmlns:a14="http://schemas.microsoft.com/office/drawing/2010/main" xmlns="" w="9525">
+                <a14:hiddenLine xmlns="" xmlns:a14="http://schemas.microsoft.com/office/drawing/2010/main" w="9525">
                   <a:solidFill>
                     <a:srgbClr val="000000"/>
                   </a:solidFill>
@@ -4248,7 +4255,7 @@
             </a:ln>
             <a:extLst>
               <a:ext uri="{91240B29-F687-4f45-9708-019B960494DF}">
-                <a14:hiddenLine xmlns:a14="http://schemas.microsoft.com/office/drawing/2010/main" xmlns="" w="9525">
+                <a14:hiddenLine xmlns="" xmlns:a14="http://schemas.microsoft.com/office/drawing/2010/main" w="9525">
                   <a:solidFill>
                     <a:srgbClr val="000000"/>
                   </a:solidFill>
@@ -4388,7 +4395,7 @@
           <a:p>
             <a:fld id="{9C17621E-A84D-4243-837E-666FB9B7337D}" type="datetimeFigureOut">
               <a:rPr lang="en-US" smtClean="0"/>
-              <a:t>7/14/2019</a:t>
+              <a:t>8/6/2019</a:t>
             </a:fld>
             <a:endParaRPr lang="en-US"/>
           </a:p>
@@ -4655,7 +4662,7 @@
           <a:p>
             <a:fld id="{9C17621E-A84D-4243-837E-666FB9B7337D}" type="datetimeFigureOut">
               <a:rPr lang="en-US" smtClean="0"/>
-              <a:t>7/14/2019</a:t>
+              <a:t>8/6/2019</a:t>
             </a:fld>
             <a:endParaRPr lang="en-US"/>
           </a:p>
@@ -4851,7 +4858,7 @@
           <a:p>
             <a:fld id="{9C17621E-A84D-4243-837E-666FB9B7337D}" type="datetimeFigureOut">
               <a:rPr lang="en-US" smtClean="0"/>
-              <a:t>7/14/2019</a:t>
+              <a:t>8/6/2019</a:t>
             </a:fld>
             <a:endParaRPr lang="en-US"/>
           </a:p>
@@ -5114,7 +5121,7 @@
           <a:p>
             <a:fld id="{9C17621E-A84D-4243-837E-666FB9B7337D}" type="datetimeFigureOut">
               <a:rPr lang="en-US" smtClean="0"/>
-              <a:t>7/14/2019</a:t>
+              <a:t>8/6/2019</a:t>
             </a:fld>
             <a:endParaRPr lang="en-US"/>
           </a:p>
@@ -5548,7 +5555,7 @@
           <a:p>
             <a:fld id="{9C17621E-A84D-4243-837E-666FB9B7337D}" type="datetimeFigureOut">
               <a:rPr lang="en-US" smtClean="0"/>
-              <a:t>7/14/2019</a:t>
+              <a:t>8/6/2019</a:t>
             </a:fld>
             <a:endParaRPr lang="en-US"/>
           </a:p>
@@ -6094,7 +6101,7 @@
           <a:p>
             <a:fld id="{9C17621E-A84D-4243-837E-666FB9B7337D}" type="datetimeFigureOut">
               <a:rPr lang="en-US" smtClean="0"/>
-              <a:t>7/14/2019</a:t>
+              <a:t>8/6/2019</a:t>
             </a:fld>
             <a:endParaRPr lang="en-US"/>
           </a:p>
@@ -6814,7 +6821,7 @@
           <a:p>
             <a:fld id="{9C17621E-A84D-4243-837E-666FB9B7337D}" type="datetimeFigureOut">
               <a:rPr lang="en-US" smtClean="0"/>
-              <a:t>7/14/2019</a:t>
+              <a:t>8/6/2019</a:t>
             </a:fld>
             <a:endParaRPr lang="en-US"/>
           </a:p>
@@ -6984,7 +6991,7 @@
           <a:p>
             <a:fld id="{9C17621E-A84D-4243-837E-666FB9B7337D}" type="datetimeFigureOut">
               <a:rPr lang="en-US" smtClean="0"/>
-              <a:t>7/14/2019</a:t>
+              <a:t>8/6/2019</a:t>
             </a:fld>
             <a:endParaRPr lang="en-US"/>
           </a:p>
@@ -7164,7 +7171,7 @@
           <a:p>
             <a:fld id="{9C17621E-A84D-4243-837E-666FB9B7337D}" type="datetimeFigureOut">
               <a:rPr lang="en-US" smtClean="0"/>
-              <a:t>7/14/2019</a:t>
+              <a:t>8/6/2019</a:t>
             </a:fld>
             <a:endParaRPr lang="en-US"/>
           </a:p>
@@ -7334,7 +7341,7 @@
           <a:p>
             <a:fld id="{9C17621E-A84D-4243-837E-666FB9B7337D}" type="datetimeFigureOut">
               <a:rPr lang="en-US" smtClean="0"/>
-              <a:t>7/14/2019</a:t>
+              <a:t>8/6/2019</a:t>
             </a:fld>
             <a:endParaRPr lang="en-US"/>
           </a:p>
@@ -7584,7 +7591,7 @@
           <a:p>
             <a:fld id="{9C17621E-A84D-4243-837E-666FB9B7337D}" type="datetimeFigureOut">
               <a:rPr lang="en-US" smtClean="0"/>
-              <a:t>7/14/2019</a:t>
+              <a:t>8/6/2019</a:t>
             </a:fld>
             <a:endParaRPr lang="en-US"/>
           </a:p>
@@ -7816,7 +7823,7 @@
           <a:p>
             <a:fld id="{9C17621E-A84D-4243-837E-666FB9B7337D}" type="datetimeFigureOut">
               <a:rPr lang="en-US" smtClean="0"/>
-              <a:t>7/14/2019</a:t>
+              <a:t>8/6/2019</a:t>
             </a:fld>
             <a:endParaRPr lang="en-US"/>
           </a:p>
@@ -8197,7 +8204,7 @@
           <a:p>
             <a:fld id="{9C17621E-A84D-4243-837E-666FB9B7337D}" type="datetimeFigureOut">
               <a:rPr lang="en-US" smtClean="0"/>
-              <a:t>7/14/2019</a:t>
+              <a:t>8/6/2019</a:t>
             </a:fld>
             <a:endParaRPr lang="en-US"/>
           </a:p>
@@ -8315,7 +8322,7 @@
           <a:p>
             <a:fld id="{9C17621E-A84D-4243-837E-666FB9B7337D}" type="datetimeFigureOut">
               <a:rPr lang="en-US" smtClean="0"/>
-              <a:t>7/14/2019</a:t>
+              <a:t>8/6/2019</a:t>
             </a:fld>
             <a:endParaRPr lang="en-US"/>
           </a:p>
@@ -8410,7 +8417,7 @@
           <a:p>
             <a:fld id="{9C17621E-A84D-4243-837E-666FB9B7337D}" type="datetimeFigureOut">
               <a:rPr lang="en-US" smtClean="0"/>
-              <a:t>7/14/2019</a:t>
+              <a:t>8/6/2019</a:t>
             </a:fld>
             <a:endParaRPr lang="en-US"/>
           </a:p>
@@ -8659,7 +8666,7 @@
           <a:p>
             <a:fld id="{9C17621E-A84D-4243-837E-666FB9B7337D}" type="datetimeFigureOut">
               <a:rPr lang="en-US" smtClean="0"/>
-              <a:t>7/14/2019</a:t>
+              <a:t>8/6/2019</a:t>
             </a:fld>
             <a:endParaRPr lang="en-US"/>
           </a:p>
@@ -8939,7 +8946,7 @@
           <a:p>
             <a:fld id="{9C17621E-A84D-4243-837E-666FB9B7337D}" type="datetimeFigureOut">
               <a:rPr lang="en-US" smtClean="0"/>
-              <a:t>7/14/2019</a:t>
+              <a:t>8/6/2019</a:t>
             </a:fld>
             <a:endParaRPr lang="en-US"/>
           </a:p>
@@ -9055,7 +9062,7 @@
           <a:noFill/>
           <a:extLst>
             <a:ext uri="{909E8E84-426E-40dd-AFC4-6F175D3DCCD1}">
-              <a14:hiddenFill xmlns:a14="http://schemas.microsoft.com/office/drawing/2010/main" xmlns="">
+              <a14:hiddenFill xmlns="" xmlns:a14="http://schemas.microsoft.com/office/drawing/2010/main">
                 <a:solidFill>
                   <a:srgbClr val="FFFFFF"/>
                 </a:solidFill>
@@ -9129,7 +9136,7 @@
               </a:ln>
               <a:extLst>
                 <a:ext uri="{91240B29-F687-4f45-9708-019B960494DF}">
-                  <a14:hiddenLine xmlns:a14="http://schemas.microsoft.com/office/drawing/2010/main" xmlns="" w="9525">
+                  <a14:hiddenLine xmlns="" xmlns:a14="http://schemas.microsoft.com/office/drawing/2010/main" w="9525">
                     <a:solidFill>
                       <a:srgbClr val="000000"/>
                     </a:solidFill>
@@ -9219,7 +9226,7 @@
               </a:ln>
               <a:extLst>
                 <a:ext uri="{91240B29-F687-4f45-9708-019B960494DF}">
-                  <a14:hiddenLine xmlns:a14="http://schemas.microsoft.com/office/drawing/2010/main" xmlns="" w="9525">
+                  <a14:hiddenLine xmlns="" xmlns:a14="http://schemas.microsoft.com/office/drawing/2010/main" w="9525">
                     <a:solidFill>
                       <a:srgbClr val="000000"/>
                     </a:solidFill>
@@ -9309,7 +9316,7 @@
               </a:ln>
               <a:extLst>
                 <a:ext uri="{91240B29-F687-4f45-9708-019B960494DF}">
-                  <a14:hiddenLine xmlns:a14="http://schemas.microsoft.com/office/drawing/2010/main" xmlns="" w="9525">
+                  <a14:hiddenLine xmlns="" xmlns:a14="http://schemas.microsoft.com/office/drawing/2010/main" w="9525">
                     <a:solidFill>
                       <a:srgbClr val="000000"/>
                     </a:solidFill>
@@ -9371,7 +9378,7 @@
               </a:ln>
               <a:extLst>
                 <a:ext uri="{91240B29-F687-4f45-9708-019B960494DF}">
-                  <a14:hiddenLine xmlns:a14="http://schemas.microsoft.com/office/drawing/2010/main" xmlns="" w="9525">
+                  <a14:hiddenLine xmlns="" xmlns:a14="http://schemas.microsoft.com/office/drawing/2010/main" w="9525">
                     <a:solidFill>
                       <a:srgbClr val="000000"/>
                     </a:solidFill>
@@ -9461,7 +9468,7 @@
               </a:ln>
               <a:extLst>
                 <a:ext uri="{91240B29-F687-4f45-9708-019B960494DF}">
-                  <a14:hiddenLine xmlns:a14="http://schemas.microsoft.com/office/drawing/2010/main" xmlns="" w="9525">
+                  <a14:hiddenLine xmlns="" xmlns:a14="http://schemas.microsoft.com/office/drawing/2010/main" w="9525">
                     <a:solidFill>
                       <a:srgbClr val="000000"/>
                     </a:solidFill>
@@ -9523,7 +9530,7 @@
               </a:ln>
               <a:extLst>
                 <a:ext uri="{91240B29-F687-4f45-9708-019B960494DF}">
-                  <a14:hiddenLine xmlns:a14="http://schemas.microsoft.com/office/drawing/2010/main" xmlns="" w="9525">
+                  <a14:hiddenLine xmlns="" xmlns:a14="http://schemas.microsoft.com/office/drawing/2010/main" w="9525">
                     <a:solidFill>
                       <a:srgbClr val="000000"/>
                     </a:solidFill>
@@ -9585,7 +9592,7 @@
               </a:ln>
               <a:extLst>
                 <a:ext uri="{91240B29-F687-4f45-9708-019B960494DF}">
-                  <a14:hiddenLine xmlns:a14="http://schemas.microsoft.com/office/drawing/2010/main" xmlns="" w="9525">
+                  <a14:hiddenLine xmlns="" xmlns:a14="http://schemas.microsoft.com/office/drawing/2010/main" w="9525">
                     <a:solidFill>
                       <a:srgbClr val="000000"/>
                     </a:solidFill>
@@ -9675,7 +9682,7 @@
               </a:ln>
               <a:extLst>
                 <a:ext uri="{91240B29-F687-4f45-9708-019B960494DF}">
-                  <a14:hiddenLine xmlns:a14="http://schemas.microsoft.com/office/drawing/2010/main" xmlns="" w="9525">
+                  <a14:hiddenLine xmlns="" xmlns:a14="http://schemas.microsoft.com/office/drawing/2010/main" w="9525">
                     <a:solidFill>
                       <a:srgbClr val="000000"/>
                     </a:solidFill>
@@ -9765,7 +9772,7 @@
               </a:ln>
               <a:extLst>
                 <a:ext uri="{91240B29-F687-4f45-9708-019B960494DF}">
-                  <a14:hiddenLine xmlns:a14="http://schemas.microsoft.com/office/drawing/2010/main" xmlns="" w="9525">
+                  <a14:hiddenLine xmlns="" xmlns:a14="http://schemas.microsoft.com/office/drawing/2010/main" w="9525">
                     <a:solidFill>
                       <a:srgbClr val="000000"/>
                     </a:solidFill>
@@ -9827,7 +9834,7 @@
               </a:ln>
               <a:extLst>
                 <a:ext uri="{91240B29-F687-4f45-9708-019B960494DF}">
-                  <a14:hiddenLine xmlns:a14="http://schemas.microsoft.com/office/drawing/2010/main" xmlns="" w="9525">
+                  <a14:hiddenLine xmlns="" xmlns:a14="http://schemas.microsoft.com/office/drawing/2010/main" w="9525">
                     <a:solidFill>
                       <a:srgbClr val="000000"/>
                     </a:solidFill>
@@ -9937,7 +9944,7 @@
               </a:ln>
               <a:extLst>
                 <a:ext uri="{91240B29-F687-4f45-9708-019B960494DF}">
-                  <a14:hiddenLine xmlns:a14="http://schemas.microsoft.com/office/drawing/2010/main" xmlns="" w="9525">
+                  <a14:hiddenLine xmlns="" xmlns:a14="http://schemas.microsoft.com/office/drawing/2010/main" w="9525">
                     <a:solidFill>
                       <a:srgbClr val="000000"/>
                     </a:solidFill>
@@ -10021,7 +10028,7 @@
               </a:ln>
               <a:extLst>
                 <a:ext uri="{91240B29-F687-4f45-9708-019B960494DF}">
-                  <a14:hiddenLine xmlns:a14="http://schemas.microsoft.com/office/drawing/2010/main" xmlns="" w="9525">
+                  <a14:hiddenLine xmlns="" xmlns:a14="http://schemas.microsoft.com/office/drawing/2010/main" w="9525">
                     <a:solidFill>
                       <a:srgbClr val="000000"/>
                     </a:solidFill>
@@ -10083,7 +10090,7 @@
               </a:ln>
               <a:extLst>
                 <a:ext uri="{91240B29-F687-4f45-9708-019B960494DF}">
-                  <a14:hiddenLine xmlns:a14="http://schemas.microsoft.com/office/drawing/2010/main" xmlns="" w="9525">
+                  <a14:hiddenLine xmlns="" xmlns:a14="http://schemas.microsoft.com/office/drawing/2010/main" w="9525">
                     <a:solidFill>
                       <a:srgbClr val="000000"/>
                     </a:solidFill>
@@ -10145,7 +10152,7 @@
               </a:ln>
               <a:extLst>
                 <a:ext uri="{91240B29-F687-4f45-9708-019B960494DF}">
-                  <a14:hiddenLine xmlns:a14="http://schemas.microsoft.com/office/drawing/2010/main" xmlns="" w="9525">
+                  <a14:hiddenLine xmlns="" xmlns:a14="http://schemas.microsoft.com/office/drawing/2010/main" w="9525">
                     <a:solidFill>
                       <a:srgbClr val="000000"/>
                     </a:solidFill>
@@ -10235,7 +10242,7 @@
               </a:ln>
               <a:extLst>
                 <a:ext uri="{91240B29-F687-4f45-9708-019B960494DF}">
-                  <a14:hiddenLine xmlns:a14="http://schemas.microsoft.com/office/drawing/2010/main" xmlns="" w="9525">
+                  <a14:hiddenLine xmlns="" xmlns:a14="http://schemas.microsoft.com/office/drawing/2010/main" w="9525">
                     <a:solidFill>
                       <a:srgbClr val="000000"/>
                     </a:solidFill>
@@ -10269,7 +10276,7 @@
               </a:ln>
               <a:extLst>
                 <a:ext uri="{91240B29-F687-4f45-9708-019B960494DF}">
-                  <a14:hiddenLine xmlns:a14="http://schemas.microsoft.com/office/drawing/2010/main" xmlns="" w="9525">
+                  <a14:hiddenLine xmlns="" xmlns:a14="http://schemas.microsoft.com/office/drawing/2010/main" w="9525">
                     <a:solidFill>
                       <a:srgbClr val="000000"/>
                     </a:solidFill>
@@ -10334,7 +10341,7 @@
               </a:ln>
               <a:extLst>
                 <a:ext uri="{91240B29-F687-4f45-9708-019B960494DF}">
-                  <a14:hiddenLine xmlns:a14="http://schemas.microsoft.com/office/drawing/2010/main" xmlns="" w="9525">
+                  <a14:hiddenLine xmlns="" xmlns:a14="http://schemas.microsoft.com/office/drawing/2010/main" w="9525">
                     <a:solidFill>
                       <a:srgbClr val="000000"/>
                     </a:solidFill>
@@ -10424,7 +10431,7 @@
               </a:ln>
               <a:extLst>
                 <a:ext uri="{91240B29-F687-4f45-9708-019B960494DF}">
-                  <a14:hiddenLine xmlns:a14="http://schemas.microsoft.com/office/drawing/2010/main" xmlns="" w="9525">
+                  <a14:hiddenLine xmlns="" xmlns:a14="http://schemas.microsoft.com/office/drawing/2010/main" w="9525">
                     <a:solidFill>
                       <a:srgbClr val="000000"/>
                     </a:solidFill>
@@ -10486,7 +10493,7 @@
               </a:ln>
               <a:extLst>
                 <a:ext uri="{91240B29-F687-4f45-9708-019B960494DF}">
-                  <a14:hiddenLine xmlns:a14="http://schemas.microsoft.com/office/drawing/2010/main" xmlns="" w="9525">
+                  <a14:hiddenLine xmlns="" xmlns:a14="http://schemas.microsoft.com/office/drawing/2010/main" w="9525">
                     <a:solidFill>
                       <a:srgbClr val="000000"/>
                     </a:solidFill>
@@ -10576,7 +10583,7 @@
               </a:ln>
               <a:extLst>
                 <a:ext uri="{91240B29-F687-4f45-9708-019B960494DF}">
-                  <a14:hiddenLine xmlns:a14="http://schemas.microsoft.com/office/drawing/2010/main" xmlns="" w="9525">
+                  <a14:hiddenLine xmlns="" xmlns:a14="http://schemas.microsoft.com/office/drawing/2010/main" w="9525">
                     <a:solidFill>
                       <a:srgbClr val="000000"/>
                     </a:solidFill>
@@ -10641,7 +10648,7 @@
               </a:ln>
               <a:extLst>
                 <a:ext uri="{91240B29-F687-4f45-9708-019B960494DF}">
-                  <a14:hiddenLine xmlns:a14="http://schemas.microsoft.com/office/drawing/2010/main" xmlns="" w="9525">
+                  <a14:hiddenLine xmlns="" xmlns:a14="http://schemas.microsoft.com/office/drawing/2010/main" w="9525">
                     <a:solidFill>
                       <a:srgbClr val="000000"/>
                     </a:solidFill>
@@ -10703,7 +10710,7 @@
               </a:ln>
               <a:extLst>
                 <a:ext uri="{91240B29-F687-4f45-9708-019B960494DF}">
-                  <a14:hiddenLine xmlns:a14="http://schemas.microsoft.com/office/drawing/2010/main" xmlns="" w="9525">
+                  <a14:hiddenLine xmlns="" xmlns:a14="http://schemas.microsoft.com/office/drawing/2010/main" w="9525">
                     <a:solidFill>
                       <a:srgbClr val="000000"/>
                     </a:solidFill>
@@ -10793,7 +10800,7 @@
               </a:ln>
               <a:extLst>
                 <a:ext uri="{91240B29-F687-4f45-9708-019B960494DF}">
-                  <a14:hiddenLine xmlns:a14="http://schemas.microsoft.com/office/drawing/2010/main" xmlns="" w="9525">
+                  <a14:hiddenLine xmlns="" xmlns:a14="http://schemas.microsoft.com/office/drawing/2010/main" w="9525">
                     <a:solidFill>
                       <a:srgbClr val="000000"/>
                     </a:solidFill>
@@ -10883,7 +10890,7 @@
               </a:ln>
               <a:extLst>
                 <a:ext uri="{91240B29-F687-4f45-9708-019B960494DF}">
-                  <a14:hiddenLine xmlns:a14="http://schemas.microsoft.com/office/drawing/2010/main" xmlns="" w="9525">
+                  <a14:hiddenLine xmlns="" xmlns:a14="http://schemas.microsoft.com/office/drawing/2010/main" w="9525">
                     <a:solidFill>
                       <a:srgbClr val="000000"/>
                     </a:solidFill>
@@ -10948,7 +10955,7 @@
               </a:ln>
               <a:extLst>
                 <a:ext uri="{91240B29-F687-4f45-9708-019B960494DF}">
-                  <a14:hiddenLine xmlns:a14="http://schemas.microsoft.com/office/drawing/2010/main" xmlns="" w="9525">
+                  <a14:hiddenLine xmlns="" xmlns:a14="http://schemas.microsoft.com/office/drawing/2010/main" w="9525">
                     <a:solidFill>
                       <a:srgbClr val="000000"/>
                     </a:solidFill>
@@ -11068,7 +11075,7 @@
               </a:ln>
               <a:extLst>
                 <a:ext uri="{91240B29-F687-4f45-9708-019B960494DF}">
-                  <a14:hiddenLine xmlns:a14="http://schemas.microsoft.com/office/drawing/2010/main" xmlns="" w="9525">
+                  <a14:hiddenLine xmlns="" xmlns:a14="http://schemas.microsoft.com/office/drawing/2010/main" w="9525">
                     <a:solidFill>
                       <a:srgbClr val="000000"/>
                     </a:solidFill>
@@ -11166,7 +11173,7 @@
               </a:ln>
               <a:extLst>
                 <a:ext uri="{91240B29-F687-4f45-9708-019B960494DF}">
-                  <a14:hiddenLine xmlns:a14="http://schemas.microsoft.com/office/drawing/2010/main" xmlns="" w="9525">
+                  <a14:hiddenLine xmlns="" xmlns:a14="http://schemas.microsoft.com/office/drawing/2010/main" w="9525">
                     <a:solidFill>
                       <a:srgbClr val="000000"/>
                     </a:solidFill>
@@ -11281,7 +11288,7 @@
               </a:ln>
               <a:extLst>
                 <a:ext uri="{91240B29-F687-4f45-9708-019B960494DF}">
-                  <a14:hiddenLine xmlns:a14="http://schemas.microsoft.com/office/drawing/2010/main" xmlns="" w="9525">
+                  <a14:hiddenLine xmlns="" xmlns:a14="http://schemas.microsoft.com/office/drawing/2010/main" w="9525">
                     <a:solidFill>
                       <a:srgbClr val="000000"/>
                     </a:solidFill>
@@ -11371,7 +11378,7 @@
               </a:ln>
               <a:extLst>
                 <a:ext uri="{91240B29-F687-4f45-9708-019B960494DF}">
-                  <a14:hiddenLine xmlns:a14="http://schemas.microsoft.com/office/drawing/2010/main" xmlns="" w="9525">
+                  <a14:hiddenLine xmlns="" xmlns:a14="http://schemas.microsoft.com/office/drawing/2010/main" w="9525">
                     <a:solidFill>
                       <a:srgbClr val="000000"/>
                     </a:solidFill>
@@ -11436,7 +11443,7 @@
               </a:ln>
               <a:extLst>
                 <a:ext uri="{91240B29-F687-4f45-9708-019B960494DF}">
-                  <a14:hiddenLine xmlns:a14="http://schemas.microsoft.com/office/drawing/2010/main" xmlns="" w="9525">
+                  <a14:hiddenLine xmlns="" xmlns:a14="http://schemas.microsoft.com/office/drawing/2010/main" w="9525">
                     <a:solidFill>
                       <a:srgbClr val="000000"/>
                     </a:solidFill>
@@ -11526,7 +11533,7 @@
               </a:ln>
               <a:extLst>
                 <a:ext uri="{91240B29-F687-4f45-9708-019B960494DF}">
-                  <a14:hiddenLine xmlns:a14="http://schemas.microsoft.com/office/drawing/2010/main" xmlns="" w="9525">
+                  <a14:hiddenLine xmlns="" xmlns:a14="http://schemas.microsoft.com/office/drawing/2010/main" w="9525">
                     <a:solidFill>
                       <a:srgbClr val="000000"/>
                     </a:solidFill>
@@ -11594,7 +11601,7 @@
               </a:ln>
               <a:extLst>
                 <a:ext uri="{91240B29-F687-4f45-9708-019B960494DF}">
-                  <a14:hiddenLine xmlns:a14="http://schemas.microsoft.com/office/drawing/2010/main" xmlns="" w="9525">
+                  <a14:hiddenLine xmlns="" xmlns:a14="http://schemas.microsoft.com/office/drawing/2010/main" w="9525">
                     <a:solidFill>
                       <a:srgbClr val="000000"/>
                     </a:solidFill>
@@ -11684,7 +11691,7 @@
               </a:ln>
               <a:extLst>
                 <a:ext uri="{91240B29-F687-4f45-9708-019B960494DF}">
-                  <a14:hiddenLine xmlns:a14="http://schemas.microsoft.com/office/drawing/2010/main" xmlns="" w="9525">
+                  <a14:hiddenLine xmlns="" xmlns:a14="http://schemas.microsoft.com/office/drawing/2010/main" w="9525">
                     <a:solidFill>
                       <a:srgbClr val="000000"/>
                     </a:solidFill>
@@ -11752,7 +11759,7 @@
               </a:ln>
               <a:extLst>
                 <a:ext uri="{91240B29-F687-4f45-9708-019B960494DF}">
-                  <a14:hiddenLine xmlns:a14="http://schemas.microsoft.com/office/drawing/2010/main" xmlns="" w="9525">
+                  <a14:hiddenLine xmlns="" xmlns:a14="http://schemas.microsoft.com/office/drawing/2010/main" w="9525">
                     <a:solidFill>
                       <a:srgbClr val="000000"/>
                     </a:solidFill>
@@ -11842,7 +11849,7 @@
               </a:ln>
               <a:extLst>
                 <a:ext uri="{91240B29-F687-4f45-9708-019B960494DF}">
-                  <a14:hiddenLine xmlns:a14="http://schemas.microsoft.com/office/drawing/2010/main" xmlns="" w="9525">
+                  <a14:hiddenLine xmlns="" xmlns:a14="http://schemas.microsoft.com/office/drawing/2010/main" w="9525">
                     <a:solidFill>
                       <a:srgbClr val="000000"/>
                     </a:solidFill>
@@ -11876,7 +11883,7 @@
               </a:ln>
               <a:extLst>
                 <a:ext uri="{91240B29-F687-4f45-9708-019B960494DF}">
-                  <a14:hiddenLine xmlns:a14="http://schemas.microsoft.com/office/drawing/2010/main" xmlns="" w="9525">
+                  <a14:hiddenLine xmlns="" xmlns:a14="http://schemas.microsoft.com/office/drawing/2010/main" w="9525">
                     <a:solidFill>
                       <a:srgbClr val="000000"/>
                     </a:solidFill>
@@ -12016,7 +12023,7 @@
           <a:p>
             <a:fld id="{9C17621E-A84D-4243-837E-666FB9B7337D}" type="datetimeFigureOut">
               <a:rPr lang="en-US" smtClean="0"/>
-              <a:t>7/14/2019</a:t>
+              <a:t>8/6/2019</a:t>
             </a:fld>
             <a:endParaRPr lang="en-US"/>
           </a:p>
@@ -12644,7 +12651,7 @@
             <a:pPr algn="ctr"/>
             <a:r>
               <a:rPr lang="en-US" dirty="0"/>
-              <a:t>Origin &amp; purpose</a:t>
+              <a:t>Origin</a:t>
             </a:r>
           </a:p>
         </p:txBody>
@@ -12674,15 +12681,6 @@
               <a:rPr lang="en-US" dirty="0"/>
               <a:t>Originally defined in 2011 by RFC 6455</a:t>
             </a:r>
-          </a:p>
-          <a:p>
-            <a:r>
-              <a:rPr lang="en-US" dirty="0"/>
-              <a:t>Created to provide better bidirectional communication between client and server</a:t>
-            </a:r>
-          </a:p>
-          <a:p>
-            <a:endParaRPr lang="en-US" dirty="0"/>
           </a:p>
           <a:p>
             <a:endParaRPr lang="en-US" dirty="0"/>
@@ -12769,6 +12767,40 @@
           <a:bodyPr/>
           <a:lstStyle/>
           <a:p>
+            <a:r>
+              <a:rPr lang="en-US" dirty="0"/>
+              <a:t>Created to solve bidirectional communication issues with server</a:t>
+            </a:r>
+          </a:p>
+          <a:p>
+            <a:r>
+              <a:rPr lang="en-US" dirty="0"/>
+              <a:t>Issues before:</a:t>
+            </a:r>
+          </a:p>
+          <a:p>
+            <a:pPr lvl="1"/>
+            <a:r>
+              <a:rPr lang="en-US" dirty="0"/>
+              <a:t> Server is forced to use TCP connection for sending to client and a new one for each incoming client request</a:t>
+            </a:r>
+          </a:p>
+          <a:p>
+            <a:pPr lvl="1"/>
+            <a:r>
+              <a:rPr lang="en-US" dirty="0"/>
+              <a:t>High unnecessary overhead of HTTP header on each message</a:t>
+            </a:r>
+          </a:p>
+          <a:p>
+            <a:pPr lvl="1"/>
+            <a:r>
+              <a:rPr lang="en-US" dirty="0"/>
+              <a:t>Client forced to map outgoing connections to the incoming connection when tracking replies</a:t>
+            </a:r>
+          </a:p>
+          <a:p>
+            <a:pPr lvl="1"/>
             <a:endParaRPr lang="en-US" dirty="0"/>
           </a:p>
         </p:txBody>
@@ -12824,7 +12856,11 @@
           <a:bodyPr/>
           <a:lstStyle/>
           <a:p>
-            <a:endParaRPr lang="en-US" dirty="0"/>
+            <a:pPr algn="ctr"/>
+            <a:r>
+              <a:rPr lang="en-US" dirty="0"/>
+              <a:t>Design Philosophy</a:t>
+            </a:r>
           </a:p>
         </p:txBody>
       </p:sp>
@@ -12849,7 +12885,23 @@
           <a:bodyPr/>
           <a:lstStyle/>
           <a:p>
-            <a:endParaRPr lang="en-US"/>
+            <a:r>
+              <a:rPr lang="en-US" dirty="0"/>
+              <a:t>Designed on the principle that there should be minimal framing</a:t>
+            </a:r>
+          </a:p>
+          <a:p>
+            <a:pPr lvl="1"/>
+            <a:r>
+              <a:rPr lang="en-US" dirty="0"/>
+              <a:t>the only framing that exists is to make the protocol frame-based instead of stream-based and to support a distinction between Unicode text and binary frames</a:t>
+            </a:r>
+          </a:p>
+          <a:p>
+            <a:r>
+              <a:rPr lang="en-US" dirty="0"/>
+              <a:t>Any desired metadata would be layered on top of WebSocket by the application</a:t>
+            </a:r>
           </a:p>
         </p:txBody>
       </p:sp>
@@ -12867,6 +12919,99 @@
 </file>
 
 <file path=ppt/slides/slide5.xml><?xml version="1.0" encoding="utf-8"?>
+<p:sld xmlns:a="http://schemas.openxmlformats.org/drawingml/2006/main" xmlns:r="http://schemas.openxmlformats.org/officeDocument/2006/relationships" xmlns:p="http://schemas.openxmlformats.org/presentationml/2006/main">
+  <p:cSld>
+    <p:spTree>
+      <p:nvGrpSpPr>
+        <p:cNvPr id="1" name=""/>
+        <p:cNvGrpSpPr/>
+        <p:nvPr/>
+      </p:nvGrpSpPr>
+      <p:grpSpPr>
+        <a:xfrm>
+          <a:off x="0" y="0"/>
+          <a:ext cx="0" cy="0"/>
+          <a:chOff x="0" y="0"/>
+          <a:chExt cx="0" cy="0"/>
+        </a:xfrm>
+      </p:grpSpPr>
+      <p:sp>
+        <p:nvSpPr>
+          <p:cNvPr id="2" name="Title 1">
+            <a:extLst>
+              <a:ext uri="{FF2B5EF4-FFF2-40B4-BE49-F238E27FC236}">
+                <a16:creationId xmlns:a16="http://schemas.microsoft.com/office/drawing/2014/main" id="{2806940D-9E61-41CE-A99F-D74E115721E3}"/>
+              </a:ext>
+            </a:extLst>
+          </p:cNvPr>
+          <p:cNvSpPr>
+            <a:spLocks noGrp="1"/>
+          </p:cNvSpPr>
+          <p:nvPr>
+            <p:ph type="title"/>
+          </p:nvPr>
+        </p:nvSpPr>
+        <p:spPr/>
+        <p:txBody>
+          <a:bodyPr/>
+          <a:lstStyle/>
+          <a:p>
+            <a:pPr algn="ctr"/>
+            <a:r>
+              <a:rPr lang="en-US" dirty="0"/>
+              <a:t>Relation to Network Stack</a:t>
+            </a:r>
+          </a:p>
+        </p:txBody>
+      </p:sp>
+      <p:sp>
+        <p:nvSpPr>
+          <p:cNvPr id="3" name="Content Placeholder 2">
+            <a:extLst>
+              <a:ext uri="{FF2B5EF4-FFF2-40B4-BE49-F238E27FC236}">
+                <a16:creationId xmlns:a16="http://schemas.microsoft.com/office/drawing/2014/main" id="{345C40EB-BB62-4B13-BB18-80B72C9D08DF}"/>
+              </a:ext>
+            </a:extLst>
+          </p:cNvPr>
+          <p:cNvSpPr>
+            <a:spLocks noGrp="1"/>
+          </p:cNvSpPr>
+          <p:nvPr>
+            <p:ph idx="1"/>
+          </p:nvPr>
+        </p:nvSpPr>
+        <p:spPr/>
+        <p:txBody>
+          <a:bodyPr/>
+          <a:lstStyle/>
+          <a:p>
+            <a:r>
+              <a:rPr lang="en-US" dirty="0"/>
+              <a:t>The WebSocket Protocol is an independent TCP-based protocol.  Its only relationship to HTTP is that its handshake is interpreted by HTTP servers as an Upgrade request</a:t>
+            </a:r>
+          </a:p>
+          <a:p>
+            <a:r>
+              <a:rPr lang="en-US" dirty="0"/>
+              <a:t>Also sits at the Application Layer of the network stack</a:t>
+            </a:r>
+          </a:p>
+        </p:txBody>
+      </p:sp>
+    </p:spTree>
+    <p:extLst>
+      <p:ext uri="{BB962C8B-B14F-4D97-AF65-F5344CB8AC3E}">
+        <p14:creationId xmlns:p14="http://schemas.microsoft.com/office/powerpoint/2010/main" val="3578516227"/>
+      </p:ext>
+    </p:extLst>
+  </p:cSld>
+  <p:clrMapOvr>
+    <a:masterClrMapping/>
+  </p:clrMapOvr>
+</p:sld>
+</file>
+
+<file path=ppt/slides/slide6.xml><?xml version="1.0" encoding="utf-8"?>
 <p:sld xmlns:a="http://schemas.openxmlformats.org/drawingml/2006/main" xmlns:r="http://schemas.openxmlformats.org/officeDocument/2006/relationships" xmlns:p="http://schemas.openxmlformats.org/presentationml/2006/main">
   <p:cSld>
     <p:spTree>
@@ -12956,7 +13101,155 @@
 </p:sld>
 </file>
 
-<file path=ppt/slides/slide6.xml><?xml version="1.0" encoding="utf-8"?>
+<file path=ppt/slides/slide7.xml><?xml version="1.0" encoding="utf-8"?>
+<p:sld xmlns:a="http://schemas.openxmlformats.org/drawingml/2006/main" xmlns:r="http://schemas.openxmlformats.org/officeDocument/2006/relationships" xmlns:p="http://schemas.openxmlformats.org/presentationml/2006/main">
+  <p:cSld>
+    <p:spTree>
+      <p:nvGrpSpPr>
+        <p:cNvPr id="1" name=""/>
+        <p:cNvGrpSpPr/>
+        <p:nvPr/>
+      </p:nvGrpSpPr>
+      <p:grpSpPr>
+        <a:xfrm>
+          <a:off x="0" y="0"/>
+          <a:ext cx="0" cy="0"/>
+          <a:chOff x="0" y="0"/>
+          <a:chExt cx="0" cy="0"/>
+        </a:xfrm>
+      </p:grpSpPr>
+      <p:sp>
+        <p:nvSpPr>
+          <p:cNvPr id="2" name="Title 1">
+            <a:extLst>
+              <a:ext uri="{FF2B5EF4-FFF2-40B4-BE49-F238E27FC236}">
+                <a16:creationId xmlns:a16="http://schemas.microsoft.com/office/drawing/2014/main" id="{CE298178-092C-40D5-928A-E00B49B6DA0E}"/>
+              </a:ext>
+            </a:extLst>
+          </p:cNvPr>
+          <p:cNvSpPr>
+            <a:spLocks noGrp="1"/>
+          </p:cNvSpPr>
+          <p:nvPr>
+            <p:ph type="title"/>
+          </p:nvPr>
+        </p:nvSpPr>
+        <p:spPr/>
+        <p:txBody>
+          <a:bodyPr/>
+          <a:lstStyle/>
+          <a:p>
+            <a:pPr algn="ctr"/>
+            <a:r>
+              <a:rPr lang="en-US" dirty="0"/>
+              <a:t>Using </a:t>
+            </a:r>
+            <a:r>
+              <a:rPr lang="en-US" dirty="0" err="1"/>
+              <a:t>Websockets</a:t>
+            </a:r>
+            <a:endParaRPr lang="en-US" dirty="0"/>
+          </a:p>
+        </p:txBody>
+      </p:sp>
+      <p:sp>
+        <p:nvSpPr>
+          <p:cNvPr id="3" name="Content Placeholder 2">
+            <a:extLst>
+              <a:ext uri="{FF2B5EF4-FFF2-40B4-BE49-F238E27FC236}">
+                <a16:creationId xmlns:a16="http://schemas.microsoft.com/office/drawing/2014/main" id="{228FF6AA-324D-4AD2-822B-3B13712B9681}"/>
+              </a:ext>
+            </a:extLst>
+          </p:cNvPr>
+          <p:cNvSpPr>
+            <a:spLocks noGrp="1"/>
+          </p:cNvSpPr>
+          <p:nvPr>
+            <p:ph idx="1"/>
+          </p:nvPr>
+        </p:nvSpPr>
+        <p:spPr/>
+        <p:txBody>
+          <a:bodyPr/>
+          <a:lstStyle/>
+          <a:p>
+            <a:r>
+              <a:rPr lang="en-US" dirty="0"/>
+              <a:t>In .NET using </a:t>
+            </a:r>
+            <a:r>
+              <a:rPr lang="en-US" dirty="0" err="1"/>
+              <a:t>Websockets</a:t>
+            </a:r>
+            <a:r>
+              <a:rPr lang="en-US" dirty="0"/>
+              <a:t> is a breeze</a:t>
+            </a:r>
+          </a:p>
+          <a:p>
+            <a:r>
+              <a:rPr lang="en-US" dirty="0"/>
+              <a:t>Start in </a:t>
+            </a:r>
+            <a:r>
+              <a:rPr lang="en-US" dirty="0" err="1"/>
+              <a:t>Javascript</a:t>
+            </a:r>
+            <a:r>
+              <a:rPr lang="en-US" dirty="0"/>
+              <a:t> as a WebSocket</a:t>
+            </a:r>
+          </a:p>
+          <a:p>
+            <a:r>
+              <a:rPr lang="en-US" dirty="0"/>
+              <a:t>URI is either "</a:t>
+            </a:r>
+            <a:r>
+              <a:rPr lang="en-US" dirty="0" err="1"/>
+              <a:t>ws</a:t>
+            </a:r>
+            <a:r>
+              <a:rPr lang="en-US" dirty="0"/>
+              <a:t>" for port 80 and "</a:t>
+            </a:r>
+            <a:r>
+              <a:rPr lang="en-US" dirty="0" err="1"/>
+              <a:t>wss</a:t>
+            </a:r>
+            <a:r>
+              <a:rPr lang="en-US" dirty="0"/>
+              <a:t>" is port 443</a:t>
+            </a:r>
+          </a:p>
+          <a:p>
+            <a:r>
+              <a:rPr lang="en-US" dirty="0"/>
+              <a:t>Client side can bind events</a:t>
+            </a:r>
+          </a:p>
+          <a:p>
+            <a:r>
+              <a:rPr lang="en-US" dirty="0"/>
+              <a:t>Server side can send and receive async, reading bytes into a buffer</a:t>
+            </a:r>
+          </a:p>
+        </p:txBody>
+      </p:sp>
+    </p:spTree>
+    <p:extLst>
+      <p:ext uri="{BB962C8B-B14F-4D97-AF65-F5344CB8AC3E}">
+        <p14:creationId xmlns:p14="http://schemas.microsoft.com/office/powerpoint/2010/main" val="1784208881"/>
+      </p:ext>
+    </p:extLst>
+  </p:cSld>
+  <p:clrMapOvr>
+    <a:masterClrMapping/>
+  </p:clrMapOvr>
+</p:sld>
+</file>
+
+<file path=ppt/slides/slide8.xml><?xml version="1.0" encoding="utf-8"?>
 <p:sld xmlns:a="http://schemas.openxmlformats.org/drawingml/2006/main" xmlns:r="http://schemas.openxmlformats.org/officeDocument/2006/relationships" xmlns:p="http://schemas.openxmlformats.org/presentationml/2006/main">
   <p:cSld>
     <p:spTree>

</xml_diff>